<commit_message>
Scenario Powerpoint. Final Updated
</commit_message>
<xml_diff>
--- a/NUvention Web Scenario Assignment-Final.pptx
+++ b/NUvention Web Scenario Assignment-Final.pptx
@@ -3612,7 +3612,15 @@
             </a:pPr>
             <a:r>
               <a:rPr lang="en" sz="1000" dirty="0" smtClean="0"/>
-              <a:t>Dean has no way of knowing how much his sneakers are worth, does not have access to ppl willing to buy </a:t>
+              <a:t>Dean has no way of knowing how much his sneakers are worth, does not have access to </a:t>
+            </a:r>
+            <a:r>
+              <a:rPr lang="en" sz="1000" dirty="0" smtClean="0"/>
+              <a:t>people </a:t>
+            </a:r>
+            <a:r>
+              <a:rPr lang="en" sz="1000" dirty="0" smtClean="0"/>
+              <a:t>willing to buy </a:t>
             </a:r>
             <a:endParaRPr lang="en" sz="1000" dirty="0"/>
           </a:p>
@@ -3655,7 +3663,15 @@
             </a:pPr>
             <a:r>
               <a:rPr lang="en" sz="1000" dirty="0" smtClean="0"/>
-              <a:t>Dean opens webpage goes to “Sneakerhead” interest group and enters into a convo with other sneakerheads to advice as to where to find the shoe</a:t>
+              <a:t>Dean opens webpage goes to “Sneakerhead” interest group and enters into a convo with other sneakerheads to </a:t>
+            </a:r>
+            <a:r>
+              <a:rPr lang="en" sz="1000" dirty="0" smtClean="0"/>
+              <a:t>get advice </a:t>
+            </a:r>
+            <a:r>
+              <a:rPr lang="en" sz="1000" dirty="0" smtClean="0"/>
+              <a:t>as to where to find the shoe</a:t>
             </a:r>
             <a:endParaRPr lang="en" sz="1000" dirty="0"/>
           </a:p>
@@ -3670,7 +3686,15 @@
             </a:pPr>
             <a:r>
               <a:rPr lang="en" sz="1000" dirty="0" smtClean="0"/>
-              <a:t>Dean opens webpage and  creates a listing putting his show up for sell</a:t>
+              <a:t>Dean opens webpage and  creates a listing putting </a:t>
+            </a:r>
+            <a:r>
+              <a:rPr lang="en" sz="1000" dirty="0" smtClean="0"/>
+              <a:t>his, shoe up </a:t>
+            </a:r>
+            <a:r>
+              <a:rPr lang="en" sz="1000" dirty="0" smtClean="0"/>
+              <a:t>for sell</a:t>
             </a:r>
             <a:endParaRPr lang="en" sz="1000" dirty="0"/>
           </a:p>
@@ -4025,7 +4049,15 @@
             </a:pPr>
             <a:r>
               <a:rPr lang="en" sz="1000" dirty="0" smtClean="0"/>
-              <a:t>Shayla is curious as to what is latest purse of Louis Vuitton</a:t>
+              <a:t>Shayla is curious as to what </a:t>
+            </a:r>
+            <a:r>
+              <a:rPr lang="en" sz="1000" dirty="0" smtClean="0"/>
+              <a:t>is the Louis Vuitton </a:t>
+            </a:r>
+            <a:r>
+              <a:rPr lang="en" sz="1000" dirty="0" smtClean="0"/>
+              <a:t>latest purse </a:t>
             </a:r>
           </a:p>
           <a:p>
@@ -4076,7 +4108,15 @@
             </a:pPr>
             <a:r>
               <a:rPr lang="en" sz="1000" dirty="0" smtClean="0"/>
-              <a:t>Shayla needs to find affordable access to other authenticate high end purses  </a:t>
+              <a:t>Shayla needs to find affordable access to other </a:t>
+            </a:r>
+            <a:r>
+              <a:rPr lang="en" sz="1000" dirty="0" smtClean="0"/>
+              <a:t>authentic </a:t>
+            </a:r>
+            <a:r>
+              <a:rPr lang="en" sz="1000" dirty="0" smtClean="0"/>
+              <a:t>high end purses  </a:t>
             </a:r>
           </a:p>
           <a:p>
@@ -4483,8 +4523,13 @@
             </a:pPr>
             <a:r>
               <a:rPr lang="en" sz="1000" dirty="0"/>
-              <a:t>Character and market:</a:t>
-            </a:r>
+              <a:t>Character and </a:t>
+            </a:r>
+            <a:r>
+              <a:rPr lang="en" sz="1000" dirty="0" smtClean="0"/>
+              <a:t>market:</a:t>
+            </a:r>
+            <a:endParaRPr lang="en" sz="1000" dirty="0"/>
           </a:p>
           <a:p>
             <a:pPr marL="914400" lvl="1" indent="-317500" rtl="0">
@@ -4553,7 +4598,15 @@
             </a:pPr>
             <a:r>
               <a:rPr lang="en-US" sz="1000" dirty="0" smtClean="0"/>
-              <a:t>Marc owns a pair of Google Glass that he doesn’t mind to rent out to friends for several days and make some money. </a:t>
+              <a:t>Marc owns a pair of Google </a:t>
+            </a:r>
+            <a:r>
+              <a:rPr lang="en-US" sz="1000" dirty="0" smtClean="0"/>
+              <a:t>Glasses </a:t>
+            </a:r>
+            <a:r>
+              <a:rPr lang="en-US" sz="1000" dirty="0" smtClean="0"/>
+              <a:t>that he doesn’t mind to rent out to friends for several days and make some money. </a:t>
             </a:r>
             <a:endParaRPr lang="en" sz="1000" dirty="0"/>
           </a:p>
@@ -4640,15 +4693,27 @@
             </a:pPr>
             <a:r>
               <a:rPr lang="en-US" sz="1000" dirty="0" smtClean="0"/>
-              <a:t>Marc lists his Google Glass and can select the renter by checking his score, </a:t>
+              <a:t>Marc lists his Google </a:t>
+            </a:r>
+            <a:r>
+              <a:rPr lang="en-US" sz="1000" dirty="0" smtClean="0"/>
+              <a:t>Glasses </a:t>
+            </a:r>
+            <a:r>
+              <a:rPr lang="en-US" sz="1000" dirty="0" smtClean="0"/>
+              <a:t>and can select the renter by checking his score, </a:t>
             </a:r>
             <a:r>
               <a:rPr lang="en-US" altLang="zh-CN" sz="1000" dirty="0"/>
               <a:t>reviews and if the renter and him shares any mutual friends on </a:t>
             </a:r>
             <a:r>
-              <a:rPr lang="en-US" altLang="zh-CN" sz="1000" dirty="0" err="1" smtClean="0"/>
-              <a:t>facebook</a:t>
+              <a:rPr lang="en-US" altLang="zh-CN" sz="1000" dirty="0"/>
+              <a:t>F</a:t>
+            </a:r>
+            <a:r>
+              <a:rPr lang="en-US" altLang="zh-CN" sz="1000" dirty="0" smtClean="0"/>
+              <a:t>acebook</a:t>
             </a:r>
             <a:r>
               <a:rPr lang="en-US" altLang="zh-CN" sz="1000" dirty="0" smtClean="0"/>

</xml_diff>